<commit_message>
modif instructions tâche Juliana
voir ppt
</commit_message>
<xml_diff>
--- a/src/Self_Efficacy/Stimuli/Instructions.pptx
+++ b/src/Self_Efficacy/Stimuli/Instructions.pptx
@@ -3167,8 +3167,13 @@
             </a:r>
             <a:r>
               <a:rPr lang="en-GB" sz="2400" dirty="0"/>
-              <a:t> pour continuer et lire la suite</a:t>
-            </a:r>
+              <a:t> pour continuer et lire la </a:t>
+            </a:r>
+            <a:r>
+              <a:rPr lang="en-GB" sz="2400" dirty="0" smtClean="0"/>
+              <a:t>suite.</a:t>
+            </a:r>
+            <a:endParaRPr lang="en-GB" sz="2400" dirty="0"/>
           </a:p>
           <a:p>
             <a:pPr algn="ctr">
@@ -3229,8 +3234,12 @@
               <a:t> </a:t>
             </a:r>
             <a:r>
-              <a:rPr lang="en-GB" sz="2400" dirty="0" err="1"/>
+              <a:rPr lang="en-GB" sz="2400" dirty="0" err="1" smtClean="0"/>
               <a:t>précédente</a:t>
+            </a:r>
+            <a:r>
+              <a:rPr lang="en-GB" sz="2400" smtClean="0"/>
+              <a:t>.</a:t>
             </a:r>
             <a:endParaRPr lang="fr-FR" sz="2400" dirty="0"/>
           </a:p>
@@ -6183,11 +6192,7 @@
             </a:r>
             <a:r>
               <a:rPr lang="en-GB" sz="2400" dirty="0" smtClean="0"/>
-              <a:t> environs 20 </a:t>
-            </a:r>
-            <a:r>
-              <a:rPr lang="en-GB" sz="2400" dirty="0" smtClean="0"/>
-              <a:t>minutes.</a:t>
+              <a:t> environs 20 minutes.</a:t>
             </a:r>
             <a:endParaRPr lang="en-GB" sz="2400" dirty="0"/>
           </a:p>
@@ -6287,11 +6292,7 @@
             </a:r>
             <a:r>
               <a:rPr lang="en-GB" sz="2400" dirty="0" smtClean="0"/>
-              <a:t>. </a:t>
-            </a:r>
-            <a:r>
-              <a:rPr lang="en-GB" sz="2400" dirty="0" smtClean="0"/>
-              <a:t>Nous </a:t>
+              <a:t>. Nous </a:t>
             </a:r>
             <a:r>
               <a:rPr lang="en-GB" sz="2400" dirty="0" err="1"/>
@@ -6369,7 +6370,6 @@
               <a:rPr lang="en-GB" sz="2400" dirty="0" smtClean="0"/>
               <a:t>.</a:t>
             </a:r>
-            <a:endParaRPr lang="en-GB" sz="2400" dirty="0" smtClean="0"/>
           </a:p>
           <a:p>
             <a:pPr algn="ctr"/>
@@ -7388,7 +7388,6 @@
               <a:rPr lang="en-GB" sz="2400" dirty="0"/>
               <a:t> la phase de test.</a:t>
             </a:r>
-            <a:endParaRPr lang="en-GB" sz="2400" dirty="0"/>
           </a:p>
         </p:txBody>
       </p:sp>
@@ -8196,13 +8195,8 @@
             </a:r>
             <a:r>
               <a:rPr lang="fr-FR" sz="2400" dirty="0" smtClean="0"/>
-              <a:t> plus de l’emplacement de l’autre chiffre composant la paire</a:t>
-            </a:r>
-            <a:r>
-              <a:rPr lang="fr-FR" sz="2400" dirty="0" smtClean="0"/>
-              <a:t>. </a:t>
-            </a:r>
-            <a:endParaRPr lang="fr-FR" sz="2400" dirty="0" smtClean="0"/>
+              <a:t> plus de l’emplacement de l’autre chiffre composant la paire. </a:t>
+            </a:r>
           </a:p>
           <a:p>
             <a:pPr algn="ctr">
@@ -8212,11 +8206,7 @@
             </a:pPr>
             <a:r>
               <a:rPr lang="fr-FR" sz="2400" dirty="0" smtClean="0"/>
-              <a:t>Vous pourrez alors cliquer sur le bouton « Montrez-moi la prochaine paire</a:t>
-            </a:r>
-            <a:r>
-              <a:rPr lang="fr-FR" sz="2400" dirty="0" smtClean="0"/>
-              <a:t> », en bas à gauche de la grille:</a:t>
+              <a:t>Vous pourrez alors cliquer sur le bouton « Montrez-moi la prochaine paire », en bas à gauche de la grille:</a:t>
             </a:r>
             <a:endParaRPr lang="fr-FR" sz="2400" b="1" dirty="0"/>
           </a:p>
@@ -9686,11 +9676,7 @@
             </a:r>
             <a:r>
               <a:rPr lang="en-GB" sz="2400" dirty="0" smtClean="0"/>
-              <a:t> ser</a:t>
-            </a:r>
-            <a:r>
-              <a:rPr lang="en-GB" sz="2400" dirty="0" smtClean="0"/>
-              <a:t>a </a:t>
+              <a:t> sera </a:t>
             </a:r>
             <a:r>
               <a:rPr lang="en-GB" sz="2400" dirty="0" err="1" smtClean="0"/>
@@ -10129,7 +10115,6 @@
               <a:rPr lang="en-GB" sz="2400" dirty="0" smtClean="0"/>
               <a:t> sur un emplacement de la grille: </a:t>
             </a:r>
-            <a:endParaRPr lang="en-GB" sz="2400" dirty="0" smtClean="0"/>
           </a:p>
         </p:txBody>
       </p:sp>
@@ -11370,11 +11355,6 @@
               </a:rPr>
               <a:t>RÉSUMÉ</a:t>
             </a:r>
-            <a:endParaRPr lang="en-GB" sz="2400" b="1" dirty="0">
-              <a:solidFill>
-                <a:srgbClr val="0070C0"/>
-              </a:solidFill>
-            </a:endParaRPr>
           </a:p>
         </p:txBody>
       </p:sp>
@@ -12185,19 +12165,7 @@
             </a:r>
             <a:r>
               <a:rPr lang="fr-FR" sz="2400" dirty="0" smtClean="0"/>
-              <a:t>, </a:t>
-            </a:r>
-            <a:r>
-              <a:rPr lang="fr-FR" sz="2400" dirty="0" smtClean="0"/>
-              <a:t>vous devrez doser votre effort pour atteindre </a:t>
-            </a:r>
-            <a:r>
-              <a:rPr lang="fr-FR" sz="2400" dirty="0" smtClean="0"/>
-              <a:t>l</a:t>
-            </a:r>
-            <a:r>
-              <a:rPr lang="fr-FR" sz="2400" dirty="0" smtClean="0"/>
-              <a:t>e score cible.</a:t>
+              <a:t>, vous devrez doser votre effort pour atteindre le score cible.</a:t>
             </a:r>
             <a:endParaRPr lang="fr-FR" sz="2400" dirty="0"/>
           </a:p>
@@ -12474,11 +12442,7 @@
             </a:r>
             <a:r>
               <a:rPr lang="en-GB" sz="2400" dirty="0" smtClean="0"/>
-              <a:t> </a:t>
-            </a:r>
-            <a:r>
-              <a:rPr lang="en-GB" sz="2400" dirty="0" smtClean="0"/>
-              <a:t>demander </a:t>
+              <a:t> demander </a:t>
             </a:r>
             <a:r>
               <a:rPr lang="en-GB" sz="2400" dirty="0" err="1" smtClean="0"/>

</xml_diff>

<commit_message>
changed to allow pairs to have different images
</commit_message>
<xml_diff>
--- a/src/Self_Efficacy/Stimuli/Instructions.pptx
+++ b/src/Self_Efficacy/Stimuli/Instructions.pptx
@@ -276,7 +276,7 @@
           <a:p>
             <a:fld id="{1C2A38D2-D57A-4E64-B95F-0826012D069A}" type="datetimeFigureOut">
               <a:rPr lang="en-GB" smtClean="0"/>
-              <a:t>23/09/2020</a:t>
+              <a:t>08/10/2020</a:t>
             </a:fld>
             <a:endParaRPr lang="en-GB" dirty="0"/>
           </a:p>
@@ -318,7 +318,7 @@
           <a:p>
             <a:fld id="{9D7F7A4F-C86B-4E97-8396-79EF10BBD040}" type="slidenum">
               <a:rPr lang="en-GB" smtClean="0"/>
-              <a:t>‹N°›</a:t>
+              <a:t>‹#›</a:t>
             </a:fld>
             <a:endParaRPr lang="en-GB" dirty="0"/>
           </a:p>
@@ -446,7 +446,7 @@
           <a:p>
             <a:fld id="{1C2A38D2-D57A-4E64-B95F-0826012D069A}" type="datetimeFigureOut">
               <a:rPr lang="en-GB" smtClean="0"/>
-              <a:t>23/09/2020</a:t>
+              <a:t>08/10/2020</a:t>
             </a:fld>
             <a:endParaRPr lang="en-GB" dirty="0"/>
           </a:p>
@@ -488,7 +488,7 @@
           <a:p>
             <a:fld id="{9D7F7A4F-C86B-4E97-8396-79EF10BBD040}" type="slidenum">
               <a:rPr lang="en-GB" smtClean="0"/>
-              <a:t>‹N°›</a:t>
+              <a:t>‹#›</a:t>
             </a:fld>
             <a:endParaRPr lang="en-GB" dirty="0"/>
           </a:p>
@@ -626,7 +626,7 @@
           <a:p>
             <a:fld id="{1C2A38D2-D57A-4E64-B95F-0826012D069A}" type="datetimeFigureOut">
               <a:rPr lang="en-GB" smtClean="0"/>
-              <a:t>23/09/2020</a:t>
+              <a:t>08/10/2020</a:t>
             </a:fld>
             <a:endParaRPr lang="en-GB" dirty="0"/>
           </a:p>
@@ -668,7 +668,7 @@
           <a:p>
             <a:fld id="{9D7F7A4F-C86B-4E97-8396-79EF10BBD040}" type="slidenum">
               <a:rPr lang="en-GB" smtClean="0"/>
-              <a:t>‹N°›</a:t>
+              <a:t>‹#›</a:t>
             </a:fld>
             <a:endParaRPr lang="en-GB" dirty="0"/>
           </a:p>
@@ -796,7 +796,7 @@
           <a:p>
             <a:fld id="{1C2A38D2-D57A-4E64-B95F-0826012D069A}" type="datetimeFigureOut">
               <a:rPr lang="en-GB" smtClean="0"/>
-              <a:t>23/09/2020</a:t>
+              <a:t>08/10/2020</a:t>
             </a:fld>
             <a:endParaRPr lang="en-GB" dirty="0"/>
           </a:p>
@@ -838,7 +838,7 @@
           <a:p>
             <a:fld id="{9D7F7A4F-C86B-4E97-8396-79EF10BBD040}" type="slidenum">
               <a:rPr lang="en-GB" smtClean="0"/>
-              <a:t>‹N°›</a:t>
+              <a:t>‹#›</a:t>
             </a:fld>
             <a:endParaRPr lang="en-GB" dirty="0"/>
           </a:p>
@@ -1042,7 +1042,7 @@
           <a:p>
             <a:fld id="{1C2A38D2-D57A-4E64-B95F-0826012D069A}" type="datetimeFigureOut">
               <a:rPr lang="en-GB" smtClean="0"/>
-              <a:t>23/09/2020</a:t>
+              <a:t>08/10/2020</a:t>
             </a:fld>
             <a:endParaRPr lang="en-GB" dirty="0"/>
           </a:p>
@@ -1084,7 +1084,7 @@
           <a:p>
             <a:fld id="{9D7F7A4F-C86B-4E97-8396-79EF10BBD040}" type="slidenum">
               <a:rPr lang="en-GB" smtClean="0"/>
-              <a:t>‹N°›</a:t>
+              <a:t>‹#›</a:t>
             </a:fld>
             <a:endParaRPr lang="en-GB" dirty="0"/>
           </a:p>
@@ -1274,7 +1274,7 @@
           <a:p>
             <a:fld id="{1C2A38D2-D57A-4E64-B95F-0826012D069A}" type="datetimeFigureOut">
               <a:rPr lang="en-GB" smtClean="0"/>
-              <a:t>23/09/2020</a:t>
+              <a:t>08/10/2020</a:t>
             </a:fld>
             <a:endParaRPr lang="en-GB" dirty="0"/>
           </a:p>
@@ -1316,7 +1316,7 @@
           <a:p>
             <a:fld id="{9D7F7A4F-C86B-4E97-8396-79EF10BBD040}" type="slidenum">
               <a:rPr lang="en-GB" smtClean="0"/>
-              <a:t>‹N°›</a:t>
+              <a:t>‹#›</a:t>
             </a:fld>
             <a:endParaRPr lang="en-GB" dirty="0"/>
           </a:p>
@@ -1641,7 +1641,7 @@
           <a:p>
             <a:fld id="{1C2A38D2-D57A-4E64-B95F-0826012D069A}" type="datetimeFigureOut">
               <a:rPr lang="en-GB" smtClean="0"/>
-              <a:t>23/09/2020</a:t>
+              <a:t>08/10/2020</a:t>
             </a:fld>
             <a:endParaRPr lang="en-GB" dirty="0"/>
           </a:p>
@@ -1683,7 +1683,7 @@
           <a:p>
             <a:fld id="{9D7F7A4F-C86B-4E97-8396-79EF10BBD040}" type="slidenum">
               <a:rPr lang="en-GB" smtClean="0"/>
-              <a:t>‹N°›</a:t>
+              <a:t>‹#›</a:t>
             </a:fld>
             <a:endParaRPr lang="en-GB" dirty="0"/>
           </a:p>
@@ -1759,7 +1759,7 @@
           <a:p>
             <a:fld id="{1C2A38D2-D57A-4E64-B95F-0826012D069A}" type="datetimeFigureOut">
               <a:rPr lang="en-GB" smtClean="0"/>
-              <a:t>23/09/2020</a:t>
+              <a:t>08/10/2020</a:t>
             </a:fld>
             <a:endParaRPr lang="en-GB" dirty="0"/>
           </a:p>
@@ -1801,7 +1801,7 @@
           <a:p>
             <a:fld id="{9D7F7A4F-C86B-4E97-8396-79EF10BBD040}" type="slidenum">
               <a:rPr lang="en-GB" smtClean="0"/>
-              <a:t>‹N°›</a:t>
+              <a:t>‹#›</a:t>
             </a:fld>
             <a:endParaRPr lang="en-GB" dirty="0"/>
           </a:p>
@@ -1854,7 +1854,7 @@
           <a:p>
             <a:fld id="{1C2A38D2-D57A-4E64-B95F-0826012D069A}" type="datetimeFigureOut">
               <a:rPr lang="en-GB" smtClean="0"/>
-              <a:t>23/09/2020</a:t>
+              <a:t>08/10/2020</a:t>
             </a:fld>
             <a:endParaRPr lang="en-GB" dirty="0"/>
           </a:p>
@@ -1896,7 +1896,7 @@
           <a:p>
             <a:fld id="{9D7F7A4F-C86B-4E97-8396-79EF10BBD040}" type="slidenum">
               <a:rPr lang="en-GB" smtClean="0"/>
-              <a:t>‹N°›</a:t>
+              <a:t>‹#›</a:t>
             </a:fld>
             <a:endParaRPr lang="en-GB" dirty="0"/>
           </a:p>
@@ -2131,7 +2131,7 @@
           <a:p>
             <a:fld id="{1C2A38D2-D57A-4E64-B95F-0826012D069A}" type="datetimeFigureOut">
               <a:rPr lang="en-GB" smtClean="0"/>
-              <a:t>23/09/2020</a:t>
+              <a:t>08/10/2020</a:t>
             </a:fld>
             <a:endParaRPr lang="en-GB" dirty="0"/>
           </a:p>
@@ -2173,7 +2173,7 @@
           <a:p>
             <a:fld id="{9D7F7A4F-C86B-4E97-8396-79EF10BBD040}" type="slidenum">
               <a:rPr lang="en-GB" smtClean="0"/>
-              <a:t>‹N°›</a:t>
+              <a:t>‹#›</a:t>
             </a:fld>
             <a:endParaRPr lang="en-GB" dirty="0"/>
           </a:p>
@@ -2384,7 +2384,7 @@
           <a:p>
             <a:fld id="{1C2A38D2-D57A-4E64-B95F-0826012D069A}" type="datetimeFigureOut">
               <a:rPr lang="en-GB" smtClean="0"/>
-              <a:t>23/09/2020</a:t>
+              <a:t>08/10/2020</a:t>
             </a:fld>
             <a:endParaRPr lang="en-GB" dirty="0"/>
           </a:p>
@@ -2426,7 +2426,7 @@
           <a:p>
             <a:fld id="{9D7F7A4F-C86B-4E97-8396-79EF10BBD040}" type="slidenum">
               <a:rPr lang="en-GB" smtClean="0"/>
-              <a:t>‹N°›</a:t>
+              <a:t>‹#›</a:t>
             </a:fld>
             <a:endParaRPr lang="en-GB" dirty="0"/>
           </a:p>
@@ -2597,7 +2597,7 @@
           <a:p>
             <a:fld id="{1C2A38D2-D57A-4E64-B95F-0826012D069A}" type="datetimeFigureOut">
               <a:rPr lang="en-GB" smtClean="0"/>
-              <a:t>23/09/2020</a:t>
+              <a:t>08/10/2020</a:t>
             </a:fld>
             <a:endParaRPr lang="en-GB" dirty="0"/>
           </a:p>
@@ -2675,7 +2675,7 @@
           <a:p>
             <a:fld id="{9D7F7A4F-C86B-4E97-8396-79EF10BBD040}" type="slidenum">
               <a:rPr lang="en-GB" smtClean="0"/>
-              <a:t>‹N°›</a:t>
+              <a:t>‹#›</a:t>
             </a:fld>
             <a:endParaRPr lang="en-GB" dirty="0"/>
           </a:p>
@@ -3018,7 +3018,12 @@
             <p:ph type="title"/>
           </p:nvPr>
         </p:nvSpPr>
-        <p:spPr/>
+        <p:spPr>
+          <a:xfrm>
+            <a:off x="838200" y="-154782"/>
+            <a:ext cx="10515600" cy="1325563"/>
+          </a:xfrm>
+        </p:spPr>
         <p:txBody>
           <a:bodyPr/>
           <a:lstStyle/>
@@ -3049,8 +3054,8 @@
         </p:nvSpPr>
         <p:spPr>
           <a:xfrm>
-            <a:off x="1874196" y="1477613"/>
-            <a:ext cx="8443609" cy="3785652"/>
+            <a:off x="1874195" y="797510"/>
+            <a:ext cx="8443609" cy="5632311"/>
           </a:xfrm>
           <a:prstGeom prst="rect">
             <a:avLst/>
@@ -3066,7 +3071,7 @@
             <a:pPr algn="ctr"/>
             <a:r>
               <a:rPr lang="fr-FR" sz="2400" dirty="0"/>
-              <a:t>Cette semaine, nous avons modifié la difficulté des grilles.</a:t>
+              <a:t>Cette semaine, nous avons modifié les paires qui afficherons.</a:t>
             </a:r>
           </a:p>
           <a:p>
@@ -3077,7 +3082,7 @@
             <a:pPr algn="ctr"/>
             <a:r>
               <a:rPr lang="fr-FR" sz="2400" dirty="0"/>
-              <a:t>La modification est uniforme sur les grilles et indépendante du score cible.</a:t>
+              <a:t>Maintenant, les paires consistent d’un numéro et d’une image d’un animal (comme ci-dessous).</a:t>
             </a:r>
           </a:p>
           <a:p>
@@ -3086,65 +3091,79 @@
           </a:p>
           <a:p>
             <a:pPr algn="ctr"/>
+            <a:endParaRPr lang="fr-FR" sz="2400" dirty="0"/>
+          </a:p>
+          <a:p>
+            <a:pPr algn="ctr"/>
+            <a:endParaRPr lang="fr-FR" sz="2400" dirty="0"/>
+          </a:p>
+          <a:p>
+            <a:pPr algn="ctr"/>
+            <a:endParaRPr lang="fr-FR" sz="2400" dirty="0"/>
+          </a:p>
+          <a:p>
+            <a:pPr algn="ctr"/>
+            <a:endParaRPr lang="fr-FR" sz="2400" dirty="0"/>
+          </a:p>
+          <a:p>
+            <a:pPr algn="ctr"/>
+            <a:endParaRPr lang="fr-FR" sz="2400" dirty="0"/>
+          </a:p>
+          <a:p>
+            <a:pPr algn="ctr"/>
+            <a:endParaRPr lang="fr-FR" sz="2400" dirty="0"/>
+          </a:p>
+          <a:p>
+            <a:pPr algn="ctr"/>
+            <a:endParaRPr lang="fr-FR" sz="2400" dirty="0"/>
+          </a:p>
+          <a:p>
+            <a:pPr algn="ctr"/>
+            <a:endParaRPr lang="fr-FR" sz="2400" dirty="0"/>
+          </a:p>
+          <a:p>
+            <a:pPr algn="ctr"/>
+            <a:endParaRPr lang="fr-FR" sz="2400" dirty="0"/>
+          </a:p>
+          <a:p>
+            <a:pPr algn="ctr"/>
             <a:r>
               <a:rPr lang="fr-FR" sz="2400" dirty="0"/>
-              <a:t>Vous devez répondre à</a:t>
-            </a:r>
-            <a:r>
-              <a:rPr lang="en-GB" sz="2400" dirty="0"/>
-              <a:t> la question </a:t>
-            </a:r>
-            <a:r>
-              <a:rPr lang="fr-FR" sz="2400" dirty="0"/>
-              <a:t>d’efficacité</a:t>
-            </a:r>
-            <a:r>
-              <a:rPr lang="en-GB" sz="2400" dirty="0"/>
-              <a:t> (</a:t>
-            </a:r>
-            <a:r>
-              <a:rPr lang="fr-FR" sz="2400" dirty="0"/>
-              <a:t>celle</a:t>
-            </a:r>
-            <a:r>
-              <a:rPr lang="en-GB" sz="2400" dirty="0"/>
-              <a:t> </a:t>
-            </a:r>
-            <a:r>
-              <a:rPr lang="fr-FR" sz="2400" dirty="0"/>
-              <a:t>avec la barre rouge) par rapporte à</a:t>
-            </a:r>
-            <a:r>
-              <a:rPr lang="en-GB" sz="2400" dirty="0"/>
-              <a:t> </a:t>
-            </a:r>
-            <a:r>
-              <a:rPr lang="fr-FR" sz="2400" dirty="0"/>
-              <a:t>ce nouveau niveau de </a:t>
-            </a:r>
-            <a:r>
-              <a:rPr lang="fr-FR" sz="2400" dirty="0" err="1"/>
-              <a:t>difficult</a:t>
-            </a:r>
-            <a:r>
-              <a:rPr lang="en-GB" sz="2400" dirty="0"/>
-              <a:t>é.</a:t>
-            </a:r>
-          </a:p>
-          <a:p>
-            <a:pPr algn="ctr"/>
-            <a:endParaRPr lang="en-GB" sz="2400" dirty="0"/>
-          </a:p>
-          <a:p>
-            <a:pPr algn="ctr"/>
-            <a:r>
-              <a:rPr lang="fr-FR" sz="2400" dirty="0"/>
-              <a:t>Au début, vous pourriez trouver cette question difficile. C’est normal: essayez simplement de répondre le mieux possible.</a:t>
-            </a:r>
-            <a:endParaRPr lang="fr-FR" sz="2400" dirty="0"/>
-          </a:p>
-        </p:txBody>
-      </p:sp>
+              <a:t>Rien d'autre n'a changé.</a:t>
+            </a:r>
+          </a:p>
+        </p:txBody>
+      </p:sp>
+      <p:pic>
+        <p:nvPicPr>
+          <p:cNvPr id="3" name="Picture 2">
+            <a:extLst>
+              <a:ext uri="{FF2B5EF4-FFF2-40B4-BE49-F238E27FC236}">
+                <a16:creationId xmlns:a16="http://schemas.microsoft.com/office/drawing/2014/main" id="{75FC4D95-597B-4022-931D-398AB2BB3645}"/>
+              </a:ext>
+            </a:extLst>
+          </p:cNvPr>
+          <p:cNvPicPr>
+            <a:picLocks noChangeAspect="1"/>
+          </p:cNvPicPr>
+          <p:nvPr/>
+        </p:nvPicPr>
+        <p:blipFill>
+          <a:blip r:embed="rId2"/>
+          <a:stretch>
+            <a:fillRect/>
+          </a:stretch>
+        </p:blipFill>
+        <p:spPr>
+          <a:xfrm>
+            <a:off x="4356445" y="2484582"/>
+            <a:ext cx="3479107" cy="3228109"/>
+          </a:xfrm>
+          <a:prstGeom prst="rect">
+            <a:avLst/>
+          </a:prstGeom>
+        </p:spPr>
+      </p:pic>
     </p:spTree>
     <p:extLst>
       <p:ext uri="{BB962C8B-B14F-4D97-AF65-F5344CB8AC3E}">

</xml_diff>

<commit_message>
changed stimuli to dogs
</commit_message>
<xml_diff>
--- a/src/Self_Efficacy/Stimuli/Instructions.pptx
+++ b/src/Self_Efficacy/Stimuli/Instructions.pptx
@@ -276,7 +276,7 @@
           <a:p>
             <a:fld id="{1C2A38D2-D57A-4E64-B95F-0826012D069A}" type="datetimeFigureOut">
               <a:rPr lang="en-GB" smtClean="0"/>
-              <a:t>08/10/2020</a:t>
+              <a:t>14/10/2020</a:t>
             </a:fld>
             <a:endParaRPr lang="en-GB" dirty="0"/>
           </a:p>
@@ -446,7 +446,7 @@
           <a:p>
             <a:fld id="{1C2A38D2-D57A-4E64-B95F-0826012D069A}" type="datetimeFigureOut">
               <a:rPr lang="en-GB" smtClean="0"/>
-              <a:t>08/10/2020</a:t>
+              <a:t>14/10/2020</a:t>
             </a:fld>
             <a:endParaRPr lang="en-GB" dirty="0"/>
           </a:p>
@@ -626,7 +626,7 @@
           <a:p>
             <a:fld id="{1C2A38D2-D57A-4E64-B95F-0826012D069A}" type="datetimeFigureOut">
               <a:rPr lang="en-GB" smtClean="0"/>
-              <a:t>08/10/2020</a:t>
+              <a:t>14/10/2020</a:t>
             </a:fld>
             <a:endParaRPr lang="en-GB" dirty="0"/>
           </a:p>
@@ -796,7 +796,7 @@
           <a:p>
             <a:fld id="{1C2A38D2-D57A-4E64-B95F-0826012D069A}" type="datetimeFigureOut">
               <a:rPr lang="en-GB" smtClean="0"/>
-              <a:t>08/10/2020</a:t>
+              <a:t>14/10/2020</a:t>
             </a:fld>
             <a:endParaRPr lang="en-GB" dirty="0"/>
           </a:p>
@@ -1042,7 +1042,7 @@
           <a:p>
             <a:fld id="{1C2A38D2-D57A-4E64-B95F-0826012D069A}" type="datetimeFigureOut">
               <a:rPr lang="en-GB" smtClean="0"/>
-              <a:t>08/10/2020</a:t>
+              <a:t>14/10/2020</a:t>
             </a:fld>
             <a:endParaRPr lang="en-GB" dirty="0"/>
           </a:p>
@@ -1274,7 +1274,7 @@
           <a:p>
             <a:fld id="{1C2A38D2-D57A-4E64-B95F-0826012D069A}" type="datetimeFigureOut">
               <a:rPr lang="en-GB" smtClean="0"/>
-              <a:t>08/10/2020</a:t>
+              <a:t>14/10/2020</a:t>
             </a:fld>
             <a:endParaRPr lang="en-GB" dirty="0"/>
           </a:p>
@@ -1641,7 +1641,7 @@
           <a:p>
             <a:fld id="{1C2A38D2-D57A-4E64-B95F-0826012D069A}" type="datetimeFigureOut">
               <a:rPr lang="en-GB" smtClean="0"/>
-              <a:t>08/10/2020</a:t>
+              <a:t>14/10/2020</a:t>
             </a:fld>
             <a:endParaRPr lang="en-GB" dirty="0"/>
           </a:p>
@@ -1759,7 +1759,7 @@
           <a:p>
             <a:fld id="{1C2A38D2-D57A-4E64-B95F-0826012D069A}" type="datetimeFigureOut">
               <a:rPr lang="en-GB" smtClean="0"/>
-              <a:t>08/10/2020</a:t>
+              <a:t>14/10/2020</a:t>
             </a:fld>
             <a:endParaRPr lang="en-GB" dirty="0"/>
           </a:p>
@@ -1854,7 +1854,7 @@
           <a:p>
             <a:fld id="{1C2A38D2-D57A-4E64-B95F-0826012D069A}" type="datetimeFigureOut">
               <a:rPr lang="en-GB" smtClean="0"/>
-              <a:t>08/10/2020</a:t>
+              <a:t>14/10/2020</a:t>
             </a:fld>
             <a:endParaRPr lang="en-GB" dirty="0"/>
           </a:p>
@@ -2131,7 +2131,7 @@
           <a:p>
             <a:fld id="{1C2A38D2-D57A-4E64-B95F-0826012D069A}" type="datetimeFigureOut">
               <a:rPr lang="en-GB" smtClean="0"/>
-              <a:t>08/10/2020</a:t>
+              <a:t>14/10/2020</a:t>
             </a:fld>
             <a:endParaRPr lang="en-GB" dirty="0"/>
           </a:p>
@@ -2384,7 +2384,7 @@
           <a:p>
             <a:fld id="{1C2A38D2-D57A-4E64-B95F-0826012D069A}" type="datetimeFigureOut">
               <a:rPr lang="en-GB" smtClean="0"/>
-              <a:t>08/10/2020</a:t>
+              <a:t>14/10/2020</a:t>
             </a:fld>
             <a:endParaRPr lang="en-GB" dirty="0"/>
           </a:p>
@@ -2597,7 +2597,7 @@
           <a:p>
             <a:fld id="{1C2A38D2-D57A-4E64-B95F-0826012D069A}" type="datetimeFigureOut">
               <a:rPr lang="en-GB" smtClean="0"/>
-              <a:t>08/10/2020</a:t>
+              <a:t>14/10/2020</a:t>
             </a:fld>
             <a:endParaRPr lang="en-GB" dirty="0"/>
           </a:p>
@@ -3082,7 +3082,7 @@
             <a:pPr algn="ctr"/>
             <a:r>
               <a:rPr lang="fr-FR" sz="2400" dirty="0"/>
-              <a:t>Maintenant, les paires consistent d’un numéro et d’une image d’un animal (comme ci-dessous).</a:t>
+              <a:t>Maintenant, les paires consistent d’un numéro et d’une image d’un chien (comme ci-dessous).</a:t>
             </a:r>
           </a:p>
           <a:p>
@@ -3136,10 +3136,10 @@
       </p:sp>
       <p:pic>
         <p:nvPicPr>
-          <p:cNvPr id="3" name="Picture 2">
+          <p:cNvPr id="5" name="Picture 4">
             <a:extLst>
               <a:ext uri="{FF2B5EF4-FFF2-40B4-BE49-F238E27FC236}">
-                <a16:creationId xmlns:a16="http://schemas.microsoft.com/office/drawing/2014/main" id="{75FC4D95-597B-4022-931D-398AB2BB3645}"/>
+                <a16:creationId xmlns:a16="http://schemas.microsoft.com/office/drawing/2014/main" id="{183AF8B4-4062-41F5-8523-CF6D5BFFB93D}"/>
               </a:ext>
             </a:extLst>
           </p:cNvPr>
@@ -3156,8 +3156,8 @@
         </p:blipFill>
         <p:spPr>
           <a:xfrm>
-            <a:off x="4356445" y="2484582"/>
-            <a:ext cx="3479107" cy="3228109"/>
+            <a:off x="4407174" y="2416029"/>
+            <a:ext cx="3377652" cy="3381409"/>
           </a:xfrm>
           <a:prstGeom prst="rect">
             <a:avLst/>

</xml_diff>

<commit_message>
updated for new week
</commit_message>
<xml_diff>
--- a/src/Self_Efficacy/Stimuli/Instructions.pptx
+++ b/src/Self_Efficacy/Stimuli/Instructions.pptx
@@ -276,7 +276,7 @@
           <a:p>
             <a:fld id="{1C2A38D2-D57A-4E64-B95F-0826012D069A}" type="datetimeFigureOut">
               <a:rPr lang="en-GB" smtClean="0"/>
-              <a:t>14/10/2020</a:t>
+              <a:t>09/11/2020</a:t>
             </a:fld>
             <a:endParaRPr lang="en-GB" dirty="0"/>
           </a:p>
@@ -446,7 +446,7 @@
           <a:p>
             <a:fld id="{1C2A38D2-D57A-4E64-B95F-0826012D069A}" type="datetimeFigureOut">
               <a:rPr lang="en-GB" smtClean="0"/>
-              <a:t>14/10/2020</a:t>
+              <a:t>09/11/2020</a:t>
             </a:fld>
             <a:endParaRPr lang="en-GB" dirty="0"/>
           </a:p>
@@ -626,7 +626,7 @@
           <a:p>
             <a:fld id="{1C2A38D2-D57A-4E64-B95F-0826012D069A}" type="datetimeFigureOut">
               <a:rPr lang="en-GB" smtClean="0"/>
-              <a:t>14/10/2020</a:t>
+              <a:t>09/11/2020</a:t>
             </a:fld>
             <a:endParaRPr lang="en-GB" dirty="0"/>
           </a:p>
@@ -796,7 +796,7 @@
           <a:p>
             <a:fld id="{1C2A38D2-D57A-4E64-B95F-0826012D069A}" type="datetimeFigureOut">
               <a:rPr lang="en-GB" smtClean="0"/>
-              <a:t>14/10/2020</a:t>
+              <a:t>09/11/2020</a:t>
             </a:fld>
             <a:endParaRPr lang="en-GB" dirty="0"/>
           </a:p>
@@ -1042,7 +1042,7 @@
           <a:p>
             <a:fld id="{1C2A38D2-D57A-4E64-B95F-0826012D069A}" type="datetimeFigureOut">
               <a:rPr lang="en-GB" smtClean="0"/>
-              <a:t>14/10/2020</a:t>
+              <a:t>09/11/2020</a:t>
             </a:fld>
             <a:endParaRPr lang="en-GB" dirty="0"/>
           </a:p>
@@ -1274,7 +1274,7 @@
           <a:p>
             <a:fld id="{1C2A38D2-D57A-4E64-B95F-0826012D069A}" type="datetimeFigureOut">
               <a:rPr lang="en-GB" smtClean="0"/>
-              <a:t>14/10/2020</a:t>
+              <a:t>09/11/2020</a:t>
             </a:fld>
             <a:endParaRPr lang="en-GB" dirty="0"/>
           </a:p>
@@ -1641,7 +1641,7 @@
           <a:p>
             <a:fld id="{1C2A38D2-D57A-4E64-B95F-0826012D069A}" type="datetimeFigureOut">
               <a:rPr lang="en-GB" smtClean="0"/>
-              <a:t>14/10/2020</a:t>
+              <a:t>09/11/2020</a:t>
             </a:fld>
             <a:endParaRPr lang="en-GB" dirty="0"/>
           </a:p>
@@ -1759,7 +1759,7 @@
           <a:p>
             <a:fld id="{1C2A38D2-D57A-4E64-B95F-0826012D069A}" type="datetimeFigureOut">
               <a:rPr lang="en-GB" smtClean="0"/>
-              <a:t>14/10/2020</a:t>
+              <a:t>09/11/2020</a:t>
             </a:fld>
             <a:endParaRPr lang="en-GB" dirty="0"/>
           </a:p>
@@ -1854,7 +1854,7 @@
           <a:p>
             <a:fld id="{1C2A38D2-D57A-4E64-B95F-0826012D069A}" type="datetimeFigureOut">
               <a:rPr lang="en-GB" smtClean="0"/>
-              <a:t>14/10/2020</a:t>
+              <a:t>09/11/2020</a:t>
             </a:fld>
             <a:endParaRPr lang="en-GB" dirty="0"/>
           </a:p>
@@ -2131,7 +2131,7 @@
           <a:p>
             <a:fld id="{1C2A38D2-D57A-4E64-B95F-0826012D069A}" type="datetimeFigureOut">
               <a:rPr lang="en-GB" smtClean="0"/>
-              <a:t>14/10/2020</a:t>
+              <a:t>09/11/2020</a:t>
             </a:fld>
             <a:endParaRPr lang="en-GB" dirty="0"/>
           </a:p>
@@ -2384,7 +2384,7 @@
           <a:p>
             <a:fld id="{1C2A38D2-D57A-4E64-B95F-0826012D069A}" type="datetimeFigureOut">
               <a:rPr lang="en-GB" smtClean="0"/>
-              <a:t>14/10/2020</a:t>
+              <a:t>09/11/2020</a:t>
             </a:fld>
             <a:endParaRPr lang="en-GB" dirty="0"/>
           </a:p>
@@ -2597,7 +2597,7 @@
           <a:p>
             <a:fld id="{1C2A38D2-D57A-4E64-B95F-0826012D069A}" type="datetimeFigureOut">
               <a:rPr lang="en-GB" smtClean="0"/>
-              <a:t>14/10/2020</a:t>
+              <a:t>09/11/2020</a:t>
             </a:fld>
             <a:endParaRPr lang="en-GB" dirty="0"/>
           </a:p>
@@ -3082,7 +3082,7 @@
             <a:pPr algn="ctr"/>
             <a:r>
               <a:rPr lang="fr-FR" sz="2400" dirty="0"/>
-              <a:t>Maintenant, les paires consistent d’un numéro et d’une image d’un chien (comme ci-dessous).</a:t>
+              <a:t>Maintenant, les paires consistent d’image de chiens (comme ci-dessous).</a:t>
             </a:r>
           </a:p>
           <a:p>
@@ -3136,10 +3136,10 @@
       </p:sp>
       <p:pic>
         <p:nvPicPr>
-          <p:cNvPr id="5" name="Picture 4">
+          <p:cNvPr id="3" name="Picture 2">
             <a:extLst>
               <a:ext uri="{FF2B5EF4-FFF2-40B4-BE49-F238E27FC236}">
-                <a16:creationId xmlns:a16="http://schemas.microsoft.com/office/drawing/2014/main" id="{183AF8B4-4062-41F5-8523-CF6D5BFFB93D}"/>
+                <a16:creationId xmlns:a16="http://schemas.microsoft.com/office/drawing/2014/main" id="{829E9A02-6B17-4D31-B70B-9410C0A57833}"/>
               </a:ext>
             </a:extLst>
           </p:cNvPr>
@@ -3156,8 +3156,8 @@
         </p:blipFill>
         <p:spPr>
           <a:xfrm>
-            <a:off x="4407174" y="2416029"/>
-            <a:ext cx="3377652" cy="3381409"/>
+            <a:off x="4706698" y="2692443"/>
+            <a:ext cx="2418726" cy="2416029"/>
           </a:xfrm>
           <a:prstGeom prst="rect">
             <a:avLst/>

</xml_diff>